<commit_message>
content: Minor slides updates for Foundtions (Part 2)
</commit_message>
<xml_diff>
--- a/source/foundations/_static/analysis/algorithm_analysis.pptx
+++ b/source/foundations/_static/analysis/algorithm_analysis.pptx
@@ -3141,7 +3141,7 @@
           <a:p>
             <a:fld id="{84F29782-C61A-CD4C-9376-B0A272778357}" type="datetimeFigureOut">
               <a:rPr lang="en-NO" smtClean="0"/>
-              <a:t>25/08/2022</a:t>
+              <a:t>28/08/2023</a:t>
             </a:fld>
             <a:endParaRPr lang="en-NO"/>
           </a:p>
@@ -7227,7 +7227,60 @@
           <a:p>
             <a:r>
               <a:rPr lang="en-NO" dirty="0"/>
-              <a:t>Week 2 / Lecture 2</a:t>
+              <a:t>Foundations / Lecture 5</a:t>
+            </a:r>
+          </a:p>
+        </p:txBody>
+      </p:sp>
+      <p:sp>
+        <p:nvSpPr>
+          <p:cNvPr id="8" name="TextBox 7">
+            <a:extLst>
+              <a:ext uri="{FF2B5EF4-FFF2-40B4-BE49-F238E27FC236}">
+                <a16:creationId xmlns:a16="http://schemas.microsoft.com/office/drawing/2014/main" id="{065979BE-F509-39C7-4113-62BF64C4B007}"/>
+              </a:ext>
+            </a:extLst>
+          </p:cNvPr>
+          <p:cNvSpPr txBox="1"/>
+          <p:nvPr/>
+        </p:nvSpPr>
+        <p:spPr>
+          <a:xfrm>
+            <a:off x="8305216" y="5478317"/>
+            <a:ext cx="3639138" cy="646331"/>
+          </a:xfrm>
+          <a:prstGeom prst="rect">
+            <a:avLst/>
+          </a:prstGeom>
+          <a:noFill/>
+        </p:spPr>
+        <p:txBody>
+          <a:bodyPr wrap="none" rtlCol="0">
+            <a:spAutoFit/>
+          </a:bodyPr>
+          <a:lstStyle/>
+          <a:p>
+            <a:pPr algn="r"/>
+            <a:r>
+              <a:rPr lang="en-NO" b="1" dirty="0">
+                <a:solidFill>
+                  <a:schemeClr val="accent6"/>
+                </a:solidFill>
+                <a:latin typeface="Montserrat" pitchFamily="2" charset="77"/>
+              </a:rPr>
+              <a:t>Ask questions on menti.com</a:t>
+            </a:r>
+          </a:p>
+          <a:p>
+            <a:pPr algn="r"/>
+            <a:r>
+              <a:rPr lang="en-NO" b="1" dirty="0">
+                <a:solidFill>
+                  <a:schemeClr val="accent6"/>
+                </a:solidFill>
+                <a:latin typeface="Montserrat" pitchFamily="2" charset="77"/>
+              </a:rPr>
+              <a:t>with code 1384 3192 </a:t>
             </a:r>
           </a:p>
         </p:txBody>
@@ -11556,7 +11609,7 @@
       </p:sp>
       <p:graphicFrame>
         <p:nvGraphicFramePr>
-          <p:cNvPr id="6" name="Table 5">
+          <p:cNvPr id="6" name="Content Placeholder 5">
             <a:extLst>
               <a:ext uri="{FF2B5EF4-FFF2-40B4-BE49-F238E27FC236}">
                 <a16:creationId xmlns:a16="http://schemas.microsoft.com/office/drawing/2014/main" id="{F35FC631-4CB1-744E-36BA-D74454CC3580}"/>
@@ -15756,8 +15809,8 @@
           </a:p>
         </p:txBody>
       </p:sp>
-      <mc:AlternateContent xmlns:mc="http://schemas.openxmlformats.org/markup-compatibility/2006">
-        <mc:Choice xmlns:a14="http://schemas.microsoft.com/office/drawing/2010/main" Requires="a14">
+      <mc:AlternateContent xmlns:mc="http://schemas.openxmlformats.org/markup-compatibility/2006" xmlns:a14="http://schemas.microsoft.com/office/drawing/2010/main">
+        <mc:Choice Requires="a14">
           <p:sp>
             <p:nvSpPr>
               <p:cNvPr id="3" name="Content Placeholder 2">
@@ -15824,13 +15877,7 @@
                       <a:rPr lang="nb-NO" b="0" i="1" smtClean="0">
                         <a:latin typeface="Cambria Math" panose="02040503050406030204" pitchFamily="18" charset="0"/>
                       </a:rPr>
-                      <m:t>=0</m:t>
-                    </m:r>
-                    <m:r>
-                      <a:rPr lang="nb-NO" b="0" i="1" smtClean="0">
-                        <a:latin typeface="Cambria Math" panose="02040503050406030204" pitchFamily="18" charset="0"/>
-                      </a:rPr>
-                      <m:t>:</m:t>
+                      <m:t>=0:</m:t>
                     </m:r>
                   </m:oMath>
                 </a14:m>
@@ -15924,7 +15971,7 @@
             </p:txBody>
           </p:sp>
         </mc:Choice>
-        <mc:Fallback>
+        <mc:Fallback xmlns="">
           <p:sp>
             <p:nvSpPr>
               <p:cNvPr id="3" name="Content Placeholder 2">
@@ -15964,8 +16011,8 @@
           </p:sp>
         </mc:Fallback>
       </mc:AlternateContent>
-      <mc:AlternateContent xmlns:mc="http://schemas.openxmlformats.org/markup-compatibility/2006">
-        <mc:Choice xmlns:a14="http://schemas.microsoft.com/office/drawing/2010/main" Requires="a14">
+      <mc:AlternateContent xmlns:mc="http://schemas.openxmlformats.org/markup-compatibility/2006" xmlns:a14="http://schemas.microsoft.com/office/drawing/2010/main">
+        <mc:Choice Requires="a14">
           <p:sp>
             <p:nvSpPr>
               <p:cNvPr id="4" name="Content Placeholder 3">
@@ -16362,7 +16409,7 @@
             </p:txBody>
           </p:sp>
         </mc:Choice>
-        <mc:Fallback>
+        <mc:Fallback xmlns="">
           <p:sp>
             <p:nvSpPr>
               <p:cNvPr id="4" name="Content Placeholder 3">
@@ -16532,7 +16579,7 @@
       </p:sp>
       <p:graphicFrame>
         <p:nvGraphicFramePr>
-          <p:cNvPr id="6" name="Table 5">
+          <p:cNvPr id="6" name="Content Placeholder 5">
             <a:extLst>
               <a:ext uri="{FF2B5EF4-FFF2-40B4-BE49-F238E27FC236}">
                 <a16:creationId xmlns:a16="http://schemas.microsoft.com/office/drawing/2014/main" id="{F35FC631-4CB1-744E-36BA-D74454CC3580}"/>
@@ -19016,8 +19063,8 @@
           </a:p>
         </p:txBody>
       </p:sp>
-      <mc:AlternateContent xmlns:mc="http://schemas.openxmlformats.org/markup-compatibility/2006">
-        <mc:Choice xmlns:a14="http://schemas.microsoft.com/office/drawing/2010/main" Requires="a14">
+      <mc:AlternateContent xmlns:mc="http://schemas.openxmlformats.org/markup-compatibility/2006" xmlns:a14="http://schemas.microsoft.com/office/drawing/2010/main">
+        <mc:Choice Requires="a14">
           <p:sp>
             <p:nvSpPr>
               <p:cNvPr id="4" name="Content Placeholder 3">
@@ -19118,7 +19165,7 @@
             </p:txBody>
           </p:sp>
         </mc:Choice>
-        <mc:Fallback>
+        <mc:Fallback xmlns="">
           <p:sp>
             <p:nvSpPr>
               <p:cNvPr id="4" name="Content Placeholder 3">
@@ -24092,8 +24139,8 @@
           </a:p>
         </p:txBody>
       </p:sp>
-      <mc:AlternateContent xmlns:mc="http://schemas.openxmlformats.org/markup-compatibility/2006">
-        <mc:Choice xmlns:a14="http://schemas.microsoft.com/office/drawing/2010/main" Requires="a14">
+      <mc:AlternateContent xmlns:mc="http://schemas.openxmlformats.org/markup-compatibility/2006" xmlns:a14="http://schemas.microsoft.com/office/drawing/2010/main">
+        <mc:Choice Requires="a14">
           <p:sp>
             <p:nvSpPr>
               <p:cNvPr id="3" name="Content Placeholder 2">
@@ -24189,13 +24236,7 @@
                         <a:rPr lang="nb-NO" sz="4000" b="0" i="1" smtClean="0">
                           <a:latin typeface="Cambria Math" panose="02040503050406030204" pitchFamily="18" charset="0"/>
                         </a:rPr>
-                        <m:t>=</m:t>
-                      </m:r>
-                      <m:r>
-                        <a:rPr lang="nb-NO" sz="4000" b="0" i="1" smtClean="0">
-                          <a:latin typeface="Cambria Math" panose="02040503050406030204" pitchFamily="18" charset="0"/>
-                        </a:rPr>
-                        <m:t>5</m:t>
+                        <m:t>=5</m:t>
                       </m:r>
                       <m:r>
                         <a:rPr lang="nb-NO" sz="4000" b="0" i="1" smtClean="0">
@@ -24216,14 +24257,7 @@
                           <a:latin typeface="Cambria Math" panose="02040503050406030204" pitchFamily="18" charset="0"/>
                           <a:ea typeface="Cambria Math" panose="02040503050406030204" pitchFamily="18" charset="0"/>
                         </a:rPr>
-                        <m:t>+</m:t>
-                      </m:r>
-                      <m:r>
-                        <a:rPr lang="nb-NO" sz="4000" b="0" i="1" smtClean="0">
-                          <a:latin typeface="Cambria Math" panose="02040503050406030204" pitchFamily="18" charset="0"/>
-                          <a:ea typeface="Cambria Math" panose="02040503050406030204" pitchFamily="18" charset="0"/>
-                        </a:rPr>
-                        <m:t>9</m:t>
+                        <m:t>+9</m:t>
                       </m:r>
                     </m:oMath>
                   </m:oMathPara>
@@ -24233,7 +24267,7 @@
             </p:txBody>
           </p:sp>
         </mc:Choice>
-        <mc:Fallback>
+        <mc:Fallback xmlns="">
           <p:sp>
             <p:nvSpPr>
               <p:cNvPr id="3" name="Content Placeholder 2">

</xml_diff>